<commit_message>
Update slide cảm ơn
</commit_message>
<xml_diff>
--- a/Giới-thiệu-về-React-Redux.pptx
+++ b/Giới-thiệu-về-React-Redux.pptx
@@ -5,7 +5,7 @@
     <p:sldMasterId id="2147483665" r:id="rId1"/>
   </p:sldMasterIdLst>
   <p:notesMasterIdLst>
-    <p:notesMasterId r:id="rId20"/>
+    <p:notesMasterId r:id="rId21"/>
   </p:notesMasterIdLst>
   <p:sldIdLst>
     <p:sldId id="264" r:id="rId2"/>
@@ -26,6 +26,7 @@
     <p:sldId id="279" r:id="rId17"/>
     <p:sldId id="280" r:id="rId18"/>
     <p:sldId id="263" r:id="rId19"/>
+    <p:sldId id="281" r:id="rId20"/>
   </p:sldIdLst>
   <p:sldSz cx="12192000" cy="6858000"/>
   <p:notesSz cx="6858000" cy="9144000"/>
@@ -11748,6 +11749,115 @@
             </p:video>
           </p:childTnLst>
         </p:cTn>
+      </p:par>
+    </p:tnLst>
+  </p:timing>
+</p:sld>
+</file>
+
+<file path=ppt/slides/slide19.xml><?xml version="1.0" encoding="utf-8"?>
+<p:sld xmlns:a="http://schemas.openxmlformats.org/drawingml/2006/main" xmlns:r="http://schemas.openxmlformats.org/officeDocument/2006/relationships" xmlns:p="http://schemas.openxmlformats.org/presentationml/2006/main">
+  <p:cSld>
+    <p:spTree>
+      <p:nvGrpSpPr>
+        <p:cNvPr id="1" name=""/>
+        <p:cNvGrpSpPr/>
+        <p:nvPr/>
+      </p:nvGrpSpPr>
+      <p:grpSpPr>
+        <a:xfrm>
+          <a:off x="0" y="0"/>
+          <a:ext cx="0" cy="0"/>
+          <a:chOff x="0" y="0"/>
+          <a:chExt cx="0" cy="0"/>
+        </a:xfrm>
+      </p:grpSpPr>
+      <p:sp>
+        <p:nvSpPr>
+          <p:cNvPr id="2" name="Title 1"/>
+          <p:cNvSpPr>
+            <a:spLocks noGrp="1"/>
+          </p:cNvSpPr>
+          <p:nvPr>
+            <p:ph type="title"/>
+          </p:nvPr>
+        </p:nvSpPr>
+        <p:spPr>
+          <a:xfrm>
+            <a:off x="1687132" y="5312020"/>
+            <a:ext cx="9508387" cy="985749"/>
+          </a:xfrm>
+        </p:spPr>
+        <p:txBody>
+          <a:bodyPr>
+            <a:noAutofit/>
+          </a:bodyPr>
+          <a:lstStyle/>
+          <a:p>
+            <a:pPr algn="ctr"/>
+            <a:r>
+              <a:rPr lang="vi-VN" sz="4400" dirty="0" smtClean="0"/>
+              <a:t>Cám ơn thầy cô và các bạn đã lắng nghe</a:t>
+            </a:r>
+            <a:endParaRPr lang="vi-VN" sz="4400" dirty="0"/>
+          </a:p>
+        </p:txBody>
+      </p:sp>
+      <p:pic>
+        <p:nvPicPr>
+          <p:cNvPr id="1026" name="Picture 2" descr="https://s3.amazonaws.com/img.charteo.com/art_pictures/C0076/Contact-Thank-You-Slides_C0076_012_c01_l.png"/>
+          <p:cNvPicPr>
+            <a:picLocks noChangeAspect="1" noChangeArrowheads="1"/>
+          </p:cNvPicPr>
+          <p:nvPr/>
+        </p:nvPicPr>
+        <p:blipFill>
+          <a:blip r:embed="rId2">
+            <a:extLst>
+              <a:ext uri="{28A0092B-C50C-407E-A947-70E740481C1C}">
+                <a14:useLocalDpi xmlns:a14="http://schemas.microsoft.com/office/drawing/2010/main" val="0"/>
+              </a:ext>
+            </a:extLst>
+          </a:blip>
+          <a:srcRect/>
+          <a:stretch>
+            <a:fillRect/>
+          </a:stretch>
+        </p:blipFill>
+        <p:spPr bwMode="auto">
+          <a:xfrm>
+            <a:off x="3258914" y="413106"/>
+            <a:ext cx="6438127" cy="4828596"/>
+          </a:xfrm>
+          <a:prstGeom prst="rect">
+            <a:avLst/>
+          </a:prstGeom>
+          <a:noFill/>
+          <a:extLst>
+            <a:ext uri="{909E8E84-426E-40DD-AFC4-6F175D3DCCD1}">
+              <a14:hiddenFill xmlns:a14="http://schemas.microsoft.com/office/drawing/2010/main">
+                <a:solidFill>
+                  <a:srgbClr val="FFFFFF"/>
+                </a:solidFill>
+              </a14:hiddenFill>
+            </a:ext>
+          </a:extLst>
+        </p:spPr>
+      </p:pic>
+    </p:spTree>
+    <p:extLst>
+      <p:ext uri="{BB962C8B-B14F-4D97-AF65-F5344CB8AC3E}">
+        <p14:creationId xmlns:p14="http://schemas.microsoft.com/office/powerpoint/2010/main" val="2279912390"/>
+      </p:ext>
+    </p:extLst>
+  </p:cSld>
+  <p:clrMapOvr>
+    <a:masterClrMapping/>
+  </p:clrMapOvr>
+  <p:timing>
+    <p:tnLst>
+      <p:par>
+        <p:cTn id="1" dur="indefinite" restart="never" nodeType="tmRoot"/>
       </p:par>
     </p:tnLst>
   </p:timing>

</xml_diff>